<commit_message>
Ready to present at Baksia.
</commit_message>
<xml_diff>
--- a/ErlangWorkshop.pptx
+++ b/ErlangWorkshop.pptx
@@ -6,10 +6,10 @@
     <p:sldMasterId id="2147483828" r:id="rId2"/>
   </p:sldMasterIdLst>
   <p:notesMasterIdLst>
-    <p:notesMasterId r:id="rId24"/>
+    <p:notesMasterId r:id="rId23"/>
   </p:notesMasterIdLst>
   <p:handoutMasterIdLst>
-    <p:handoutMasterId r:id="rId25"/>
+    <p:handoutMasterId r:id="rId24"/>
   </p:handoutMasterIdLst>
   <p:sldIdLst>
     <p:sldId id="348" r:id="rId3"/>
@@ -30,9 +30,8 @@
     <p:sldId id="334" r:id="rId18"/>
     <p:sldId id="335" r:id="rId19"/>
     <p:sldId id="336" r:id="rId20"/>
-    <p:sldId id="343" r:id="rId21"/>
-    <p:sldId id="338" r:id="rId22"/>
-    <p:sldId id="307" r:id="rId23"/>
+    <p:sldId id="338" r:id="rId21"/>
+    <p:sldId id="307" r:id="rId22"/>
   </p:sldIdLst>
   <p:sldSz cx="9144000" cy="6858000" type="screen4x3"/>
   <p:notesSz cx="9296400" cy="6881813"/>
@@ -133,7 +132,7 @@
   </p:defaultTextStyle>
   <p:extLst>
     <p:ext uri="{EFAFB233-063F-42B5-8137-9DF3F51BA10A}">
-      <p15:sldGuideLst xmlns:p15="http://schemas.microsoft.com/office/powerpoint/2012/main">
+      <p15:sldGuideLst xmlns="" xmlns:p15="http://schemas.microsoft.com/office/powerpoint/2012/main">
         <p15:guide id="1" orient="horz" pos="2160">
           <p15:clr>
             <a:srgbClr val="A4A3A4"/>
@@ -147,7 +146,7 @@
       </p15:sldGuideLst>
     </p:ext>
     <p:ext uri="{2D200454-40CA-4A62-9FC3-DE9A4176ACB9}">
-      <p15:notesGuideLst xmlns:p15="http://schemas.microsoft.com/office/powerpoint/2012/main">
+      <p15:notesGuideLst xmlns="" xmlns:p15="http://schemas.microsoft.com/office/powerpoint/2012/main">
         <p15:guide id="1" orient="horz" pos="2168" userDrawn="1">
           <p15:clr>
             <a:srgbClr val="A4A3A4"/>
@@ -246,7 +245,7 @@
           <a:p>
             <a:fld id="{D8604EC3-1172-4678-8CE1-E45D4275332D}" type="datetimeFigureOut">
               <a:rPr lang="en-US" smtClean="0"/>
-              <a:t>7/12/2013</a:t>
+              <a:t>6/3/14</a:t>
             </a:fld>
             <a:endParaRPr lang="en-US"/>
           </a:p>
@@ -411,7 +410,7 @@
           <a:p>
             <a:fld id="{40E31176-5116-4ACA-8086-2D06BC959424}" type="datetimeFigureOut">
               <a:rPr lang="en-US" smtClean="0"/>
-              <a:t>7/12/2013</a:t>
+              <a:t>6/3/14</a:t>
             </a:fld>
             <a:endParaRPr lang="en-US"/>
           </a:p>
@@ -2379,7 +2378,7 @@
           <a:p>
             <a:fld id="{5B3C08A6-D9D8-4259-9739-79376FFA6951}" type="datetimeFigureOut">
               <a:rPr lang="en-US" smtClean="0"/>
-              <a:t>7/12/2013</a:t>
+              <a:t>6/3/14</a:t>
             </a:fld>
             <a:endParaRPr lang="en-US"/>
           </a:p>
@@ -2602,7 +2601,7 @@
           <a:p>
             <a:fld id="{5B3C08A6-D9D8-4259-9739-79376FFA6951}" type="datetimeFigureOut">
               <a:rPr lang="en-US" smtClean="0"/>
-              <a:t>7/12/2013</a:t>
+              <a:t>6/3/14</a:t>
             </a:fld>
             <a:endParaRPr lang="en-US"/>
           </a:p>
@@ -2882,7 +2881,7 @@
           <a:p>
             <a:fld id="{5B3C08A6-D9D8-4259-9739-79376FFA6951}" type="datetimeFigureOut">
               <a:rPr lang="en-US" smtClean="0"/>
-              <a:t>7/12/2013</a:t>
+              <a:t>6/3/14</a:t>
             </a:fld>
             <a:endParaRPr lang="en-US"/>
           </a:p>
@@ -3124,7 +3123,7 @@
           <a:p>
             <a:fld id="{5B3C08A6-D9D8-4259-9739-79376FFA6951}" type="datetimeFigureOut">
               <a:rPr lang="en-US" smtClean="0"/>
-              <a:t>7/12/2013</a:t>
+              <a:t>6/3/14</a:t>
             </a:fld>
             <a:endParaRPr lang="en-US"/>
           </a:p>
@@ -3185,7 +3184,7 @@
   <p:timing>
     <p:tnLst>
       <p:par>
-        <p:cTn id="1" dur="indefinite" restart="never" nodeType="tmRoot"/>
+        <p:cTn xmlns:p14="http://schemas.microsoft.com/office/powerpoint/2010/main" id="1" dur="indefinite" restart="never" nodeType="tmRoot"/>
       </p:par>
     </p:tnLst>
   </p:timing>
@@ -3301,7 +3300,7 @@
           <a:p>
             <a:fld id="{5B3C08A6-D9D8-4259-9739-79376FFA6951}" type="datetimeFigureOut">
               <a:rPr lang="en-US" smtClean="0"/>
-              <a:t>7/12/2013</a:t>
+              <a:t>6/3/14</a:t>
             </a:fld>
             <a:endParaRPr lang="en-US"/>
           </a:p>
@@ -3547,7 +3546,7 @@
           <a:p>
             <a:fld id="{5B3C08A6-D9D8-4259-9739-79376FFA6951}" type="datetimeFigureOut">
               <a:rPr lang="en-US" smtClean="0"/>
-              <a:t>7/12/2013</a:t>
+              <a:t>6/3/14</a:t>
             </a:fld>
             <a:endParaRPr lang="en-US"/>
           </a:p>
@@ -3835,7 +3834,7 @@
           <a:p>
             <a:fld id="{5B3C08A6-D9D8-4259-9739-79376FFA6951}" type="datetimeFigureOut">
               <a:rPr lang="en-US" smtClean="0"/>
-              <a:t>7/12/2013</a:t>
+              <a:t>6/3/14</a:t>
             </a:fld>
             <a:endParaRPr lang="en-US"/>
           </a:p>
@@ -4257,7 +4256,7 @@
           <a:p>
             <a:fld id="{5B3C08A6-D9D8-4259-9739-79376FFA6951}" type="datetimeFigureOut">
               <a:rPr lang="en-US" smtClean="0"/>
-              <a:t>7/12/2013</a:t>
+              <a:t>6/3/14</a:t>
             </a:fld>
             <a:endParaRPr lang="en-US"/>
           </a:p>
@@ -4375,7 +4374,7 @@
           <a:p>
             <a:fld id="{5B3C08A6-D9D8-4259-9739-79376FFA6951}" type="datetimeFigureOut">
               <a:rPr lang="en-US" smtClean="0"/>
-              <a:t>7/12/2013</a:t>
+              <a:t>6/3/14</a:t>
             </a:fld>
             <a:endParaRPr lang="en-US"/>
           </a:p>
@@ -4470,7 +4469,7 @@
           <a:p>
             <a:fld id="{5B3C08A6-D9D8-4259-9739-79376FFA6951}" type="datetimeFigureOut">
               <a:rPr lang="en-US" smtClean="0"/>
-              <a:t>7/12/2013</a:t>
+              <a:t>6/3/14</a:t>
             </a:fld>
             <a:endParaRPr lang="en-US"/>
           </a:p>
@@ -4747,7 +4746,7 @@
           <a:p>
             <a:fld id="{5B3C08A6-D9D8-4259-9739-79376FFA6951}" type="datetimeFigureOut">
               <a:rPr lang="en-US" smtClean="0"/>
-              <a:t>7/12/2013</a:t>
+              <a:t>6/3/14</a:t>
             </a:fld>
             <a:endParaRPr lang="en-US"/>
           </a:p>
@@ -4926,7 +4925,7 @@
           <a:p>
             <a:fld id="{5B3C08A6-D9D8-4259-9739-79376FFA6951}" type="datetimeFigureOut">
               <a:rPr lang="en-US" smtClean="0"/>
-              <a:t>7/12/2013</a:t>
+              <a:t>6/3/14</a:t>
             </a:fld>
             <a:endParaRPr lang="en-US"/>
           </a:p>
@@ -5174,7 +5173,7 @@
           <a:p>
             <a:fld id="{5B3C08A6-D9D8-4259-9739-79376FFA6951}" type="datetimeFigureOut">
               <a:rPr lang="en-US" smtClean="0"/>
-              <a:t>7/12/2013</a:t>
+              <a:t>6/3/14</a:t>
             </a:fld>
             <a:endParaRPr lang="en-US"/>
           </a:p>
@@ -5344,7 +5343,7 @@
           <a:p>
             <a:fld id="{5B3C08A6-D9D8-4259-9739-79376FFA6951}" type="datetimeFigureOut">
               <a:rPr lang="en-US" smtClean="0"/>
-              <a:t>7/12/2013</a:t>
+              <a:t>6/3/14</a:t>
             </a:fld>
             <a:endParaRPr lang="en-US"/>
           </a:p>
@@ -5524,7 +5523,7 @@
           <a:p>
             <a:fld id="{5B3C08A6-D9D8-4259-9739-79376FFA6951}" type="datetimeFigureOut">
               <a:rPr lang="en-US" smtClean="0"/>
-              <a:t>7/12/2013</a:t>
+              <a:t>6/3/14</a:t>
             </a:fld>
             <a:endParaRPr lang="en-US"/>
           </a:p>
@@ -5887,7 +5886,7 @@
           <a:p>
             <a:fld id="{5B3C08A6-D9D8-4259-9739-79376FFA6951}" type="datetimeFigureOut">
               <a:rPr lang="en-US" smtClean="0"/>
-              <a:t>7/12/2013</a:t>
+              <a:t>6/3/14</a:t>
             </a:fld>
             <a:endParaRPr lang="en-US"/>
           </a:p>
@@ -6174,7 +6173,7 @@
           <a:p>
             <a:fld id="{5B3C08A6-D9D8-4259-9739-79376FFA6951}" type="datetimeFigureOut">
               <a:rPr lang="en-US" smtClean="0"/>
-              <a:t>7/12/2013</a:t>
+              <a:t>6/3/14</a:t>
             </a:fld>
             <a:endParaRPr lang="en-US"/>
           </a:p>
@@ -6596,7 +6595,7 @@
           <a:p>
             <a:fld id="{5B3C08A6-D9D8-4259-9739-79376FFA6951}" type="datetimeFigureOut">
               <a:rPr lang="en-US" smtClean="0"/>
-              <a:t>7/12/2013</a:t>
+              <a:t>6/3/14</a:t>
             </a:fld>
             <a:endParaRPr lang="en-US"/>
           </a:p>
@@ -6711,7 +6710,7 @@
           <a:p>
             <a:fld id="{5B3C08A6-D9D8-4259-9739-79376FFA6951}" type="datetimeFigureOut">
               <a:rPr lang="en-US" smtClean="0"/>
-              <a:t>7/12/2013</a:t>
+              <a:t>6/3/14</a:t>
             </a:fld>
             <a:endParaRPr lang="en-US"/>
           </a:p>
@@ -6801,7 +6800,7 @@
           <a:p>
             <a:fld id="{5B3C08A6-D9D8-4259-9739-79376FFA6951}" type="datetimeFigureOut">
               <a:rPr lang="en-US" smtClean="0"/>
-              <a:t>7/12/2013</a:t>
+              <a:t>6/3/14</a:t>
             </a:fld>
             <a:endParaRPr lang="en-US"/>
           </a:p>
@@ -7079,7 +7078,7 @@
           <a:p>
             <a:fld id="{5B3C08A6-D9D8-4259-9739-79376FFA6951}" type="datetimeFigureOut">
               <a:rPr lang="en-US" smtClean="0"/>
-              <a:t>7/12/2013</a:t>
+              <a:t>6/3/14</a:t>
             </a:fld>
             <a:endParaRPr lang="en-US"/>
           </a:p>
@@ -7445,7 +7444,7 @@
           <a:p>
             <a:fld id="{5B3C08A6-D9D8-4259-9739-79376FFA6951}" type="datetimeFigureOut">
               <a:rPr lang="en-US" smtClean="0"/>
-              <a:t>7/12/2013</a:t>
+              <a:t>6/3/14</a:t>
             </a:fld>
             <a:endParaRPr lang="en-US"/>
           </a:p>
@@ -7882,7 +7881,7 @@
           <a:p>
             <a:fld id="{5B3C08A6-D9D8-4259-9739-79376FFA6951}" type="datetimeFigureOut">
               <a:rPr lang="en-US" smtClean="0"/>
-              <a:t>7/12/2013</a:t>
+              <a:t>6/3/14</a:t>
             </a:fld>
             <a:endParaRPr lang="en-US"/>
           </a:p>
@@ -8423,7 +8422,7 @@
           <a:p>
             <a:fld id="{5B3C08A6-D9D8-4259-9739-79376FFA6951}" type="datetimeFigureOut">
               <a:rPr lang="en-US" smtClean="0"/>
-              <a:t>7/12/2013</a:t>
+              <a:t>6/3/14</a:t>
             </a:fld>
             <a:endParaRPr lang="en-US"/>
           </a:p>
@@ -8798,6 +8797,36 @@
           <a:chExt cx="0" cy="0"/>
         </a:xfrm>
       </p:grpSpPr>
+      <p:pic>
+        <p:nvPicPr>
+          <p:cNvPr id="7" name="Picture 6" descr="oslo_2331.JPG"/>
+          <p:cNvPicPr>
+            <a:picLocks noChangeAspect="1"/>
+          </p:cNvPicPr>
+          <p:nvPr/>
+        </p:nvPicPr>
+        <p:blipFill>
+          <a:blip r:embed="rId3">
+            <a:extLst>
+              <a:ext uri="{28A0092B-C50C-407E-A947-70E740481C1C}">
+                <a14:useLocalDpi xmlns:a14="http://schemas.microsoft.com/office/drawing/2010/main" val="0"/>
+              </a:ext>
+            </a:extLst>
+          </a:blip>
+          <a:stretch>
+            <a:fillRect/>
+          </a:stretch>
+        </p:blipFill>
+        <p:spPr>
+          <a:xfrm>
+            <a:off x="-2133600" y="-152400"/>
+            <a:ext cx="12118914" cy="4343400"/>
+          </a:xfrm>
+          <a:prstGeom prst="rect">
+            <a:avLst/>
+          </a:prstGeom>
+        </p:spPr>
+      </p:pic>
       <p:sp>
         <p:nvSpPr>
           <p:cNvPr id="5" name="Rectangle 4"/>
@@ -9110,7 +9139,7 @@
         </p:nvSpPr>
         <p:spPr>
           <a:xfrm>
-            <a:off x="5486400" y="4263146"/>
+            <a:off x="5486400" y="4114800"/>
             <a:ext cx="3352800" cy="2209800"/>
           </a:xfrm>
           <a:prstGeom prst="rect">
@@ -9325,7 +9354,37 @@
                   </a:prstClr>
                 </a:solidFill>
               </a:rPr>
-              <a:t>codestock</a:t>
+              <a:t>baksia</a:t>
+            </a:r>
+            <a:endParaRPr lang="en-US" sz="2600" dirty="0" smtClean="0">
+              <a:solidFill>
+                <a:prstClr val="white">
+                  <a:lumMod val="95000"/>
+                </a:prstClr>
+              </a:solidFill>
+            </a:endParaRPr>
+          </a:p>
+          <a:p>
+            <a:pPr algn="r"/>
+            <a:r>
+              <a:rPr lang="en-US" sz="2600" dirty="0" smtClean="0">
+                <a:solidFill>
+                  <a:prstClr val="white">
+                    <a:lumMod val="95000"/>
+                  </a:prstClr>
+                </a:solidFill>
+              </a:rPr>
+              <a:t>#</a:t>
+            </a:r>
+            <a:r>
+              <a:rPr lang="en-US" sz="2600" dirty="0" err="1" smtClean="0">
+                <a:solidFill>
+                  <a:prstClr val="white">
+                    <a:lumMod val="95000"/>
+                  </a:prstClr>
+                </a:solidFill>
+              </a:rPr>
+              <a:t>ndcoslo</a:t>
             </a:r>
             <a:r>
               <a:rPr lang="en-US" sz="2600" dirty="0" smtClean="0">
@@ -9454,7 +9513,7 @@
           <p:nvPr/>
         </p:nvPicPr>
         <p:blipFill>
-          <a:blip r:embed="rId3" cstate="print">
+          <a:blip r:embed="rId4" cstate="print">
             <a:extLst>
               <a:ext uri="{28A0092B-C50C-407E-A947-70E740481C1C}">
                 <a14:useLocalDpi xmlns:a14="http://schemas.microsoft.com/office/drawing/2010/main" val="0"/>
@@ -9480,14 +9539,14 @@
           </a:ln>
           <a:effectLst/>
           <a:extLst>
-            <a:ext uri="{909E8E84-426E-40DD-AFC4-6F175D3DCCD1}">
+            <a:ext uri="{909E8E84-426E-40dd-AFC4-6F175D3DCCD1}">
               <a14:hiddenFill xmlns:a14="http://schemas.microsoft.com/office/drawing/2010/main">
                 <a:solidFill>
                   <a:schemeClr val="accent1"/>
                 </a:solidFill>
               </a14:hiddenFill>
             </a:ext>
-            <a:ext uri="{91240B29-F687-4F45-9708-019B960494DF}">
+            <a:ext uri="{91240B29-F687-4f45-9708-019B960494DF}">
               <a14:hiddenLine xmlns:a14="http://schemas.microsoft.com/office/drawing/2010/main" w="9525">
                 <a:solidFill>
                   <a:schemeClr val="tx1"/>
@@ -9497,7 +9556,7 @@
                 <a:tailEnd/>
               </a14:hiddenLine>
             </a:ext>
-            <a:ext uri="{AF507438-7753-43E0-B8FC-AC1667EBCBE1}">
+            <a:ext uri="{AF507438-7753-43e0-B8FC-AC1667EBCBE1}">
               <a14:hiddenEffects xmlns:a14="http://schemas.microsoft.com/office/drawing/2010/main">
                 <a:effectLst>
                   <a:outerShdw dist="35921" dir="2700000" algn="ctr" rotWithShape="0">
@@ -9518,7 +9577,7 @@
           <p:nvPr/>
         </p:nvPicPr>
         <p:blipFill>
-          <a:blip r:embed="rId4">
+          <a:blip r:embed="rId5">
             <a:extLst>
               <a:ext uri="{28A0092B-C50C-407E-A947-70E740481C1C}">
                 <a14:useLocalDpi xmlns:a14="http://schemas.microsoft.com/office/drawing/2010/main" val="0"/>
@@ -9532,7 +9591,7 @@
         </p:blipFill>
         <p:spPr bwMode="auto">
           <a:xfrm>
-            <a:off x="533401" y="533400"/>
+            <a:off x="533400" y="381000"/>
             <a:ext cx="2241176" cy="1905000"/>
           </a:xfrm>
           <a:prstGeom prst="rect">
@@ -9552,7 +9611,7 @@
           <p:nvPr/>
         </p:nvPicPr>
         <p:blipFill>
-          <a:blip r:embed="rId5">
+          <a:blip r:embed="rId6">
             <a:extLst>
               <a:ext uri="{28A0092B-C50C-407E-A947-70E740481C1C}">
                 <a14:useLocalDpi xmlns:a14="http://schemas.microsoft.com/office/drawing/2010/main" val="0"/>
@@ -9574,7 +9633,7 @@
           </a:prstGeom>
           <a:noFill/>
           <a:extLst>
-            <a:ext uri="{909E8E84-426E-40DD-AFC4-6F175D3DCCD1}">
+            <a:ext uri="{909E8E84-426E-40dd-AFC4-6F175D3DCCD1}">
               <a14:hiddenFill xmlns:a14="http://schemas.microsoft.com/office/drawing/2010/main">
                 <a:solidFill>
                   <a:srgbClr val="FFFFFF"/>
@@ -9607,59 +9666,94 @@
           <a:lstStyle/>
           <a:p>
             <a:r>
-              <a:rPr lang="en-US" sz="3200" b="1" dirty="0" smtClean="0"/>
+              <a:rPr lang="en-US" sz="3200" b="1" dirty="0" smtClean="0">
+                <a:solidFill>
+                  <a:schemeClr val="bg1"/>
+                </a:solidFill>
+              </a:rPr>
               <a:t>In Two Hours: a hands-on</a:t>
             </a:r>
             <a:br>
-              <a:rPr lang="en-US" sz="3200" b="1" dirty="0" smtClean="0"/>
+              <a:rPr lang="en-US" sz="3200" b="1" dirty="0" smtClean="0">
+                <a:solidFill>
+                  <a:schemeClr val="bg1"/>
+                </a:solidFill>
+              </a:rPr>
             </a:br>
             <a:r>
-              <a:rPr lang="en-US" sz="3200" b="1" dirty="0" smtClean="0"/>
+              <a:rPr lang="en-US" sz="3200" b="1" dirty="0" smtClean="0">
+                <a:solidFill>
+                  <a:schemeClr val="bg1"/>
+                </a:solidFill>
+              </a:rPr>
               <a:t>workshop</a:t>
             </a:r>
-            <a:endParaRPr lang="en-US" sz="3200" b="1" dirty="0"/>
+            <a:endParaRPr lang="en-US" sz="3200" b="1" dirty="0">
+              <a:solidFill>
+                <a:schemeClr val="bg1"/>
+              </a:solidFill>
+            </a:endParaRPr>
           </a:p>
         </p:txBody>
       </p:sp>
       <p:pic>
         <p:nvPicPr>
-          <p:cNvPr id="4" name="Picture 2" descr="Dr_Nerdskull_Shirt"/>
+          <p:cNvPr id="3" name="Picture 2" descr="logoSlider.png"/>
           <p:cNvPicPr>
-            <a:picLocks noChangeAspect="1" noChangeArrowheads="1"/>
+            <a:picLocks noChangeAspect="1"/>
           </p:cNvPicPr>
           <p:nvPr/>
         </p:nvPicPr>
         <p:blipFill>
-          <a:blip r:embed="rId6">
+          <a:blip r:embed="rId7">
             <a:extLst>
               <a:ext uri="{28A0092B-C50C-407E-A947-70E740481C1C}">
                 <a14:useLocalDpi xmlns:a14="http://schemas.microsoft.com/office/drawing/2010/main" val="0"/>
               </a:ext>
             </a:extLst>
           </a:blip>
-          <a:srcRect/>
           <a:stretch>
             <a:fillRect/>
           </a:stretch>
         </p:blipFill>
-        <p:spPr bwMode="auto">
+        <p:spPr>
           <a:xfrm>
-            <a:off x="6779741" y="405825"/>
-            <a:ext cx="2057400" cy="2057400"/>
+            <a:off x="5867400" y="76200"/>
+            <a:ext cx="1955312" cy="918284"/>
           </a:xfrm>
           <a:prstGeom prst="rect">
             <a:avLst/>
           </a:prstGeom>
-          <a:noFill/>
-          <a:extLst>
-            <a:ext uri="{909E8E84-426E-40DD-AFC4-6F175D3DCCD1}">
-              <a14:hiddenFill xmlns:a14="http://schemas.microsoft.com/office/drawing/2010/main">
-                <a:solidFill>
-                  <a:srgbClr val="FFFFFF"/>
-                </a:solidFill>
-              </a14:hiddenFill>
-            </a:ext>
-          </a:extLst>
+        </p:spPr>
+      </p:pic>
+      <p:pic>
+        <p:nvPicPr>
+          <p:cNvPr id="6" name="Picture 5" descr="full_2519902.jpeg"/>
+          <p:cNvPicPr>
+            <a:picLocks noChangeAspect="1"/>
+          </p:cNvPicPr>
+          <p:nvPr/>
+        </p:nvPicPr>
+        <p:blipFill>
+          <a:blip r:embed="rId8">
+            <a:extLst>
+              <a:ext uri="{28A0092B-C50C-407E-A947-70E740481C1C}">
+                <a14:useLocalDpi xmlns:a14="http://schemas.microsoft.com/office/drawing/2010/main" val="0"/>
+              </a:ext>
+            </a:extLst>
+          </a:blip>
+          <a:stretch>
+            <a:fillRect/>
+          </a:stretch>
+        </p:blipFill>
+        <p:spPr>
+          <a:xfrm>
+            <a:off x="5867400" y="1447800"/>
+            <a:ext cx="2362200" cy="1000932"/>
+          </a:xfrm>
+          <a:prstGeom prst="rect">
+            <a:avLst/>
+          </a:prstGeom>
         </p:spPr>
       </p:pic>
     </p:spTree>
@@ -9683,7 +9777,7 @@
   <p:timing>
     <p:tnLst>
       <p:par>
-        <p:cTn id="1" dur="indefinite" restart="never" nodeType="tmRoot"/>
+        <p:cTn xmlns:p14="http://schemas.microsoft.com/office/powerpoint/2010/main" id="1" dur="indefinite" restart="never" nodeType="tmRoot"/>
       </p:par>
     </p:tnLst>
   </p:timing>
@@ -9808,7 +9902,7 @@
   <p:timing>
     <p:tnLst>
       <p:par>
-        <p:cTn id="1" dur="indefinite" restart="never" nodeType="tmRoot"/>
+        <p:cTn xmlns:p14="http://schemas.microsoft.com/office/powerpoint/2010/main" id="1" dur="indefinite" restart="never" nodeType="tmRoot"/>
       </p:par>
     </p:tnLst>
   </p:timing>
@@ -10012,7 +10106,7 @@
   <p:timing>
     <p:tnLst>
       <p:par>
-        <p:cTn id="1" dur="indefinite" restart="never" nodeType="tmRoot"/>
+        <p:cTn xmlns:p14="http://schemas.microsoft.com/office/powerpoint/2010/main" id="1" dur="indefinite" restart="never" nodeType="tmRoot"/>
       </p:par>
     </p:tnLst>
   </p:timing>
@@ -12380,7 +12474,7 @@
   <p:timing>
     <p:tnLst>
       <p:par>
-        <p:cTn id="1" dur="indefinite" restart="never" nodeType="tmRoot">
+        <p:cTn xmlns:p14="http://schemas.microsoft.com/office/powerpoint/2010/main" id="1" dur="indefinite" restart="never" nodeType="tmRoot">
           <p:childTnLst>
             <p:seq concurrent="1" nextAc="seek">
               <p:cTn id="2" dur="indefinite" nodeType="mainSeq">
@@ -13492,7 +13586,7 @@
   <p:timing>
     <p:tnLst>
       <p:par>
-        <p:cTn id="1" dur="indefinite" restart="never" nodeType="tmRoot">
+        <p:cTn xmlns:p14="http://schemas.microsoft.com/office/powerpoint/2010/main" id="1" dur="indefinite" restart="never" nodeType="tmRoot">
           <p:childTnLst>
             <p:seq concurrent="1" nextAc="seek">
               <p:cTn id="2" dur="indefinite" nodeType="mainSeq">
@@ -14397,18 +14491,18 @@
   <p:clrMapOvr>
     <a:masterClrMapping/>
   </p:clrMapOvr>
-  <mc:AlternateContent xmlns:mc="http://schemas.openxmlformats.org/markup-compatibility/2006" xmlns:p14="http://schemas.microsoft.com/office/powerpoint/2010/main">
-    <mc:Choice Requires="p14">
+  <mc:AlternateContent xmlns:mc="http://schemas.openxmlformats.org/markup-compatibility/2006">
+    <mc:Choice xmlns:p14="http://schemas.microsoft.com/office/powerpoint/2010/main" Requires="p14">
       <p:transition spd="slow" p14:dur="2000"/>
     </mc:Choice>
-    <mc:Fallback xmlns="">
-      <p:transition spd="slow"/>
+    <mc:Fallback>
+      <p:transition xmlns:p14="http://schemas.microsoft.com/office/powerpoint/2010/main" spd="slow"/>
     </mc:Fallback>
   </mc:AlternateContent>
   <p:timing>
     <p:tnLst>
       <p:par>
-        <p:cTn id="1" dur="indefinite" restart="never" nodeType="tmRoot">
+        <p:cTn xmlns:p14="http://schemas.microsoft.com/office/powerpoint/2010/main" id="1" dur="indefinite" restart="never" nodeType="tmRoot">
           <p:childTnLst>
             <p:seq concurrent="1" nextAc="seek">
               <p:cTn id="2" dur="indefinite" nodeType="mainSeq">
@@ -15811,7 +15905,7 @@
   <p:timing>
     <p:tnLst>
       <p:par>
-        <p:cTn id="1" dur="indefinite" restart="never" nodeType="tmRoot"/>
+        <p:cTn xmlns:p14="http://schemas.microsoft.com/office/powerpoint/2010/main" id="1" dur="indefinite" restart="never" nodeType="tmRoot"/>
       </p:par>
     </p:tnLst>
   </p:timing>
@@ -15870,14 +15964,14 @@
           </a:ln>
           <a:effectLst/>
           <a:extLst>
-            <a:ext uri="{909E8E84-426E-40DD-AFC4-6F175D3DCCD1}">
+            <a:ext uri="{909E8E84-426E-40dd-AFC4-6F175D3DCCD1}">
               <a14:hiddenFill xmlns:a14="http://schemas.microsoft.com/office/drawing/2010/main">
                 <a:solidFill>
                   <a:schemeClr val="accent1"/>
                 </a:solidFill>
               </a14:hiddenFill>
             </a:ext>
-            <a:ext uri="{91240B29-F687-4F45-9708-019B960494DF}">
+            <a:ext uri="{91240B29-F687-4f45-9708-019B960494DF}">
               <a14:hiddenLine xmlns:a14="http://schemas.microsoft.com/office/drawing/2010/main" w="9525">
                 <a:solidFill>
                   <a:schemeClr val="tx1"/>
@@ -15887,7 +15981,7 @@
                 <a:tailEnd/>
               </a14:hiddenLine>
             </a:ext>
-            <a:ext uri="{AF507438-7753-43E0-B8FC-AC1667EBCBE1}">
+            <a:ext uri="{AF507438-7753-43e0-B8FC-AC1667EBCBE1}">
               <a14:hiddenEffects xmlns:a14="http://schemas.microsoft.com/office/drawing/2010/main">
                 <a:effectLst>
                   <a:outerShdw dist="35921" dir="2700000" algn="ctr" rotWithShape="0">
@@ -15958,7 +16052,7 @@
   <p:timing>
     <p:tnLst>
       <p:par>
-        <p:cTn id="1" dur="indefinite" restart="never" nodeType="tmRoot"/>
+        <p:cTn xmlns:p14="http://schemas.microsoft.com/office/powerpoint/2010/main" id="1" dur="indefinite" restart="never" nodeType="tmRoot"/>
       </p:par>
     </p:tnLst>
   </p:timing>
@@ -16056,14 +16150,14 @@
           </a:ln>
           <a:effectLst/>
           <a:extLst>
-            <a:ext uri="{909E8E84-426E-40DD-AFC4-6F175D3DCCD1}">
+            <a:ext uri="{909E8E84-426E-40dd-AFC4-6F175D3DCCD1}">
               <a14:hiddenFill xmlns:a14="http://schemas.microsoft.com/office/drawing/2010/main">
                 <a:solidFill>
                   <a:schemeClr val="accent1"/>
                 </a:solidFill>
               </a14:hiddenFill>
             </a:ext>
-            <a:ext uri="{91240B29-F687-4F45-9708-019B960494DF}">
+            <a:ext uri="{91240B29-F687-4f45-9708-019B960494DF}">
               <a14:hiddenLine xmlns:a14="http://schemas.microsoft.com/office/drawing/2010/main" w="9525">
                 <a:solidFill>
                   <a:schemeClr val="tx1"/>
@@ -16073,7 +16167,7 @@
                 <a:tailEnd/>
               </a14:hiddenLine>
             </a:ext>
-            <a:ext uri="{AF507438-7753-43E0-B8FC-AC1667EBCBE1}">
+            <a:ext uri="{AF507438-7753-43e0-B8FC-AC1667EBCBE1}">
               <a14:hiddenEffects xmlns:a14="http://schemas.microsoft.com/office/drawing/2010/main">
                 <a:effectLst>
                   <a:outerShdw dist="35921" dir="2700000" algn="ctr" rotWithShape="0">
@@ -16120,14 +16214,14 @@
           </a:ln>
           <a:effectLst/>
           <a:extLst>
-            <a:ext uri="{909E8E84-426E-40DD-AFC4-6F175D3DCCD1}">
+            <a:ext uri="{909E8E84-426E-40dd-AFC4-6F175D3DCCD1}">
               <a14:hiddenFill xmlns:a14="http://schemas.microsoft.com/office/drawing/2010/main">
                 <a:solidFill>
                   <a:schemeClr val="accent1"/>
                 </a:solidFill>
               </a14:hiddenFill>
             </a:ext>
-            <a:ext uri="{91240B29-F687-4F45-9708-019B960494DF}">
+            <a:ext uri="{91240B29-F687-4f45-9708-019B960494DF}">
               <a14:hiddenLine xmlns:a14="http://schemas.microsoft.com/office/drawing/2010/main" w="9525">
                 <a:solidFill>
                   <a:schemeClr val="tx1"/>
@@ -16137,7 +16231,7 @@
                 <a:tailEnd/>
               </a14:hiddenLine>
             </a:ext>
-            <a:ext uri="{AF507438-7753-43E0-B8FC-AC1667EBCBE1}">
+            <a:ext uri="{AF507438-7753-43e0-B8FC-AC1667EBCBE1}">
               <a14:hiddenEffects xmlns:a14="http://schemas.microsoft.com/office/drawing/2010/main">
                 <a:effectLst>
                   <a:outerShdw dist="35921" dir="2700000" algn="ctr" rotWithShape="0">
@@ -16184,14 +16278,14 @@
           </a:ln>
           <a:effectLst/>
           <a:extLst>
-            <a:ext uri="{909E8E84-426E-40DD-AFC4-6F175D3DCCD1}">
+            <a:ext uri="{909E8E84-426E-40dd-AFC4-6F175D3DCCD1}">
               <a14:hiddenFill xmlns:a14="http://schemas.microsoft.com/office/drawing/2010/main">
                 <a:solidFill>
                   <a:schemeClr val="accent1"/>
                 </a:solidFill>
               </a14:hiddenFill>
             </a:ext>
-            <a:ext uri="{91240B29-F687-4F45-9708-019B960494DF}">
+            <a:ext uri="{91240B29-F687-4f45-9708-019B960494DF}">
               <a14:hiddenLine xmlns:a14="http://schemas.microsoft.com/office/drawing/2010/main" w="9525">
                 <a:solidFill>
                   <a:schemeClr val="tx1"/>
@@ -16201,7 +16295,7 @@
                 <a:tailEnd/>
               </a14:hiddenLine>
             </a:ext>
-            <a:ext uri="{AF507438-7753-43E0-B8FC-AC1667EBCBE1}">
+            <a:ext uri="{AF507438-7753-43e0-B8FC-AC1667EBCBE1}">
               <a14:hiddenEffects xmlns:a14="http://schemas.microsoft.com/office/drawing/2010/main">
                 <a:effectLst>
                   <a:outerShdw dist="35921" dir="2700000" algn="ctr" rotWithShape="0">
@@ -16248,14 +16342,14 @@
           </a:ln>
           <a:effectLst/>
           <a:extLst>
-            <a:ext uri="{909E8E84-426E-40DD-AFC4-6F175D3DCCD1}">
+            <a:ext uri="{909E8E84-426E-40dd-AFC4-6F175D3DCCD1}">
               <a14:hiddenFill xmlns:a14="http://schemas.microsoft.com/office/drawing/2010/main">
                 <a:solidFill>
                   <a:schemeClr val="accent1"/>
                 </a:solidFill>
               </a14:hiddenFill>
             </a:ext>
-            <a:ext uri="{91240B29-F687-4F45-9708-019B960494DF}">
+            <a:ext uri="{91240B29-F687-4f45-9708-019B960494DF}">
               <a14:hiddenLine xmlns:a14="http://schemas.microsoft.com/office/drawing/2010/main" w="9525">
                 <a:solidFill>
                   <a:schemeClr val="tx1"/>
@@ -16265,7 +16359,7 @@
                 <a:tailEnd/>
               </a14:hiddenLine>
             </a:ext>
-            <a:ext uri="{AF507438-7753-43E0-B8FC-AC1667EBCBE1}">
+            <a:ext uri="{AF507438-7753-43e0-B8FC-AC1667EBCBE1}">
               <a14:hiddenEffects xmlns:a14="http://schemas.microsoft.com/office/drawing/2010/main">
                 <a:effectLst>
                   <a:outerShdw dist="35921" dir="2700000" algn="ctr" rotWithShape="0">
@@ -16312,14 +16406,14 @@
           </a:ln>
           <a:effectLst/>
           <a:extLst>
-            <a:ext uri="{909E8E84-426E-40DD-AFC4-6F175D3DCCD1}">
+            <a:ext uri="{909E8E84-426E-40dd-AFC4-6F175D3DCCD1}">
               <a14:hiddenFill xmlns:a14="http://schemas.microsoft.com/office/drawing/2010/main">
                 <a:solidFill>
                   <a:schemeClr val="accent1"/>
                 </a:solidFill>
               </a14:hiddenFill>
             </a:ext>
-            <a:ext uri="{91240B29-F687-4F45-9708-019B960494DF}">
+            <a:ext uri="{91240B29-F687-4f45-9708-019B960494DF}">
               <a14:hiddenLine xmlns:a14="http://schemas.microsoft.com/office/drawing/2010/main" w="9525">
                 <a:solidFill>
                   <a:schemeClr val="tx1"/>
@@ -16329,7 +16423,7 @@
                 <a:tailEnd/>
               </a14:hiddenLine>
             </a:ext>
-            <a:ext uri="{AF507438-7753-43E0-B8FC-AC1667EBCBE1}">
+            <a:ext uri="{AF507438-7753-43e0-B8FC-AC1667EBCBE1}">
               <a14:hiddenEffects xmlns:a14="http://schemas.microsoft.com/office/drawing/2010/main">
                 <a:effectLst>
                   <a:outerShdw dist="35921" dir="2700000" algn="ctr" rotWithShape="0">
@@ -16376,14 +16470,14 @@
           </a:ln>
           <a:effectLst/>
           <a:extLst>
-            <a:ext uri="{909E8E84-426E-40DD-AFC4-6F175D3DCCD1}">
+            <a:ext uri="{909E8E84-426E-40dd-AFC4-6F175D3DCCD1}">
               <a14:hiddenFill xmlns:a14="http://schemas.microsoft.com/office/drawing/2010/main">
                 <a:solidFill>
                   <a:schemeClr val="accent1"/>
                 </a:solidFill>
               </a14:hiddenFill>
             </a:ext>
-            <a:ext uri="{91240B29-F687-4F45-9708-019B960494DF}">
+            <a:ext uri="{91240B29-F687-4f45-9708-019B960494DF}">
               <a14:hiddenLine xmlns:a14="http://schemas.microsoft.com/office/drawing/2010/main" w="9525">
                 <a:solidFill>
                   <a:schemeClr val="tx1"/>
@@ -16393,7 +16487,7 @@
                 <a:tailEnd/>
               </a14:hiddenLine>
             </a:ext>
-            <a:ext uri="{AF507438-7753-43E0-B8FC-AC1667EBCBE1}">
+            <a:ext uri="{AF507438-7753-43e0-B8FC-AC1667EBCBE1}">
               <a14:hiddenEffects xmlns:a14="http://schemas.microsoft.com/office/drawing/2010/main">
                 <a:effectLst>
                   <a:outerShdw dist="35921" dir="2700000" algn="ctr" rotWithShape="0">
@@ -16440,14 +16534,14 @@
           </a:ln>
           <a:effectLst/>
           <a:extLst>
-            <a:ext uri="{909E8E84-426E-40DD-AFC4-6F175D3DCCD1}">
+            <a:ext uri="{909E8E84-426E-40dd-AFC4-6F175D3DCCD1}">
               <a14:hiddenFill xmlns:a14="http://schemas.microsoft.com/office/drawing/2010/main">
                 <a:solidFill>
                   <a:schemeClr val="accent1"/>
                 </a:solidFill>
               </a14:hiddenFill>
             </a:ext>
-            <a:ext uri="{91240B29-F687-4F45-9708-019B960494DF}">
+            <a:ext uri="{91240B29-F687-4f45-9708-019B960494DF}">
               <a14:hiddenLine xmlns:a14="http://schemas.microsoft.com/office/drawing/2010/main" w="9525">
                 <a:solidFill>
                   <a:schemeClr val="tx1"/>
@@ -16457,7 +16551,7 @@
                 <a:tailEnd/>
               </a14:hiddenLine>
             </a:ext>
-            <a:ext uri="{AF507438-7753-43E0-B8FC-AC1667EBCBE1}">
+            <a:ext uri="{AF507438-7753-43e0-B8FC-AC1667EBCBE1}">
               <a14:hiddenEffects xmlns:a14="http://schemas.microsoft.com/office/drawing/2010/main">
                 <a:effectLst>
                   <a:outerShdw dist="35921" dir="2700000" algn="ctr" rotWithShape="0">
@@ -16504,14 +16598,14 @@
           </a:ln>
           <a:effectLst/>
           <a:extLst>
-            <a:ext uri="{909E8E84-426E-40DD-AFC4-6F175D3DCCD1}">
+            <a:ext uri="{909E8E84-426E-40dd-AFC4-6F175D3DCCD1}">
               <a14:hiddenFill xmlns:a14="http://schemas.microsoft.com/office/drawing/2010/main">
                 <a:solidFill>
                   <a:schemeClr val="accent1"/>
                 </a:solidFill>
               </a14:hiddenFill>
             </a:ext>
-            <a:ext uri="{91240B29-F687-4F45-9708-019B960494DF}">
+            <a:ext uri="{91240B29-F687-4f45-9708-019B960494DF}">
               <a14:hiddenLine xmlns:a14="http://schemas.microsoft.com/office/drawing/2010/main" w="9525">
                 <a:solidFill>
                   <a:schemeClr val="tx1"/>
@@ -16521,7 +16615,7 @@
                 <a:tailEnd/>
               </a14:hiddenLine>
             </a:ext>
-            <a:ext uri="{AF507438-7753-43E0-B8FC-AC1667EBCBE1}">
+            <a:ext uri="{AF507438-7753-43e0-B8FC-AC1667EBCBE1}">
               <a14:hiddenEffects xmlns:a14="http://schemas.microsoft.com/office/drawing/2010/main">
                 <a:effectLst>
                   <a:outerShdw dist="35921" dir="2700000" algn="ctr" rotWithShape="0">
@@ -16568,14 +16662,14 @@
           </a:ln>
           <a:effectLst/>
           <a:extLst>
-            <a:ext uri="{909E8E84-426E-40DD-AFC4-6F175D3DCCD1}">
+            <a:ext uri="{909E8E84-426E-40dd-AFC4-6F175D3DCCD1}">
               <a14:hiddenFill xmlns:a14="http://schemas.microsoft.com/office/drawing/2010/main">
                 <a:solidFill>
                   <a:schemeClr val="accent1"/>
                 </a:solidFill>
               </a14:hiddenFill>
             </a:ext>
-            <a:ext uri="{91240B29-F687-4F45-9708-019B960494DF}">
+            <a:ext uri="{91240B29-F687-4f45-9708-019B960494DF}">
               <a14:hiddenLine xmlns:a14="http://schemas.microsoft.com/office/drawing/2010/main" w="9525">
                 <a:solidFill>
                   <a:schemeClr val="tx1"/>
@@ -16585,7 +16679,7 @@
                 <a:tailEnd/>
               </a14:hiddenLine>
             </a:ext>
-            <a:ext uri="{AF507438-7753-43E0-B8FC-AC1667EBCBE1}">
+            <a:ext uri="{AF507438-7753-43e0-B8FC-AC1667EBCBE1}">
               <a14:hiddenEffects xmlns:a14="http://schemas.microsoft.com/office/drawing/2010/main">
                 <a:effectLst>
                   <a:outerShdw dist="35921" dir="2700000" algn="ctr" rotWithShape="0">
@@ -16670,14 +16764,14 @@
           </a:ln>
           <a:effectLst/>
           <a:extLst>
-            <a:ext uri="{909E8E84-426E-40DD-AFC4-6F175D3DCCD1}">
+            <a:ext uri="{909E8E84-426E-40dd-AFC4-6F175D3DCCD1}">
               <a14:hiddenFill xmlns:a14="http://schemas.microsoft.com/office/drawing/2010/main">
                 <a:solidFill>
                   <a:schemeClr val="accent1"/>
                 </a:solidFill>
               </a14:hiddenFill>
             </a:ext>
-            <a:ext uri="{91240B29-F687-4F45-9708-019B960494DF}">
+            <a:ext uri="{91240B29-F687-4f45-9708-019B960494DF}">
               <a14:hiddenLine xmlns:a14="http://schemas.microsoft.com/office/drawing/2010/main" w="9525">
                 <a:solidFill>
                   <a:schemeClr val="tx1"/>
@@ -16687,7 +16781,7 @@
                 <a:tailEnd/>
               </a14:hiddenLine>
             </a:ext>
-            <a:ext uri="{AF507438-7753-43E0-B8FC-AC1667EBCBE1}">
+            <a:ext uri="{AF507438-7753-43e0-B8FC-AC1667EBCBE1}">
               <a14:hiddenEffects xmlns:a14="http://schemas.microsoft.com/office/drawing/2010/main">
                 <a:effectLst>
                   <a:outerShdw dist="35921" dir="2700000" algn="ctr" rotWithShape="0">
@@ -16734,14 +16828,14 @@
           </a:ln>
           <a:effectLst/>
           <a:extLst>
-            <a:ext uri="{909E8E84-426E-40DD-AFC4-6F175D3DCCD1}">
+            <a:ext uri="{909E8E84-426E-40dd-AFC4-6F175D3DCCD1}">
               <a14:hiddenFill xmlns:a14="http://schemas.microsoft.com/office/drawing/2010/main">
                 <a:solidFill>
                   <a:schemeClr val="accent1"/>
                 </a:solidFill>
               </a14:hiddenFill>
             </a:ext>
-            <a:ext uri="{91240B29-F687-4F45-9708-019B960494DF}">
+            <a:ext uri="{91240B29-F687-4f45-9708-019B960494DF}">
               <a14:hiddenLine xmlns:a14="http://schemas.microsoft.com/office/drawing/2010/main" w="9525">
                 <a:solidFill>
                   <a:schemeClr val="tx1"/>
@@ -16751,7 +16845,7 @@
                 <a:tailEnd/>
               </a14:hiddenLine>
             </a:ext>
-            <a:ext uri="{AF507438-7753-43E0-B8FC-AC1667EBCBE1}">
+            <a:ext uri="{AF507438-7753-43e0-B8FC-AC1667EBCBE1}">
               <a14:hiddenEffects xmlns:a14="http://schemas.microsoft.com/office/drawing/2010/main">
                 <a:effectLst>
                   <a:outerShdw dist="35921" dir="2700000" algn="ctr" rotWithShape="0">
@@ -16798,14 +16892,14 @@
           </a:ln>
           <a:effectLst/>
           <a:extLst>
-            <a:ext uri="{909E8E84-426E-40DD-AFC4-6F175D3DCCD1}">
+            <a:ext uri="{909E8E84-426E-40dd-AFC4-6F175D3DCCD1}">
               <a14:hiddenFill xmlns:a14="http://schemas.microsoft.com/office/drawing/2010/main">
                 <a:solidFill>
                   <a:schemeClr val="accent1"/>
                 </a:solidFill>
               </a14:hiddenFill>
             </a:ext>
-            <a:ext uri="{91240B29-F687-4F45-9708-019B960494DF}">
+            <a:ext uri="{91240B29-F687-4f45-9708-019B960494DF}">
               <a14:hiddenLine xmlns:a14="http://schemas.microsoft.com/office/drawing/2010/main" w="9525">
                 <a:solidFill>
                   <a:schemeClr val="tx1"/>
@@ -16815,7 +16909,7 @@
                 <a:tailEnd/>
               </a14:hiddenLine>
             </a:ext>
-            <a:ext uri="{AF507438-7753-43E0-B8FC-AC1667EBCBE1}">
+            <a:ext uri="{AF507438-7753-43e0-B8FC-AC1667EBCBE1}">
               <a14:hiddenEffects xmlns:a14="http://schemas.microsoft.com/office/drawing/2010/main">
                 <a:effectLst>
                   <a:outerShdw dist="35921" dir="2700000" algn="ctr" rotWithShape="0">
@@ -16862,14 +16956,14 @@
           </a:ln>
           <a:effectLst/>
           <a:extLst>
-            <a:ext uri="{909E8E84-426E-40DD-AFC4-6F175D3DCCD1}">
+            <a:ext uri="{909E8E84-426E-40dd-AFC4-6F175D3DCCD1}">
               <a14:hiddenFill xmlns:a14="http://schemas.microsoft.com/office/drawing/2010/main">
                 <a:solidFill>
                   <a:schemeClr val="accent1"/>
                 </a:solidFill>
               </a14:hiddenFill>
             </a:ext>
-            <a:ext uri="{91240B29-F687-4F45-9708-019B960494DF}">
+            <a:ext uri="{91240B29-F687-4f45-9708-019B960494DF}">
               <a14:hiddenLine xmlns:a14="http://schemas.microsoft.com/office/drawing/2010/main" w="9525">
                 <a:solidFill>
                   <a:schemeClr val="tx1"/>
@@ -16879,7 +16973,7 @@
                 <a:tailEnd/>
               </a14:hiddenLine>
             </a:ext>
-            <a:ext uri="{AF507438-7753-43E0-B8FC-AC1667EBCBE1}">
+            <a:ext uri="{AF507438-7753-43e0-B8FC-AC1667EBCBE1}">
               <a14:hiddenEffects xmlns:a14="http://schemas.microsoft.com/office/drawing/2010/main">
                 <a:effectLst>
                   <a:outerShdw dist="35921" dir="2700000" algn="ctr" rotWithShape="0">
@@ -16912,7 +17006,7 @@
   <p:timing>
     <p:tnLst>
       <p:par>
-        <p:cTn id="1" dur="indefinite" restart="never" nodeType="tmRoot"/>
+        <p:cTn xmlns:p14="http://schemas.microsoft.com/office/powerpoint/2010/main" id="1" dur="indefinite" restart="never" nodeType="tmRoot"/>
       </p:par>
     </p:tnLst>
   </p:timing>
@@ -16979,14 +17073,14 @@
           </a:ln>
           <a:effectLst/>
           <a:extLst>
-            <a:ext uri="{909E8E84-426E-40DD-AFC4-6F175D3DCCD1}">
+            <a:ext uri="{909E8E84-426E-40dd-AFC4-6F175D3DCCD1}">
               <a14:hiddenFill xmlns:a14="http://schemas.microsoft.com/office/drawing/2010/main">
                 <a:solidFill>
                   <a:schemeClr val="accent1"/>
                 </a:solidFill>
               </a14:hiddenFill>
             </a:ext>
-            <a:ext uri="{91240B29-F687-4F45-9708-019B960494DF}">
+            <a:ext uri="{91240B29-F687-4f45-9708-019B960494DF}">
               <a14:hiddenLine xmlns:a14="http://schemas.microsoft.com/office/drawing/2010/main" w="9525">
                 <a:solidFill>
                   <a:schemeClr val="tx1"/>
@@ -16996,7 +17090,7 @@
                 <a:tailEnd/>
               </a14:hiddenLine>
             </a:ext>
-            <a:ext uri="{AF507438-7753-43E0-B8FC-AC1667EBCBE1}">
+            <a:ext uri="{AF507438-7753-43e0-B8FC-AC1667EBCBE1}">
               <a14:hiddenEffects xmlns:a14="http://schemas.microsoft.com/office/drawing/2010/main">
                 <a:effectLst>
                   <a:outerShdw dist="35921" dir="2700000" algn="ctr" rotWithShape="0">
@@ -18265,7 +18359,7 @@
   <p:timing>
     <p:tnLst>
       <p:par>
-        <p:cTn id="1" dur="indefinite" restart="never" nodeType="tmRoot">
+        <p:cTn xmlns:p14="http://schemas.microsoft.com/office/powerpoint/2010/main" id="1" dur="indefinite" restart="never" nodeType="tmRoot">
           <p:childTnLst>
             <p:seq concurrent="1" nextAc="seek">
               <p:cTn id="2" dur="indefinite" nodeType="mainSeq">
@@ -18500,281 +18594,6 @@
         </p:nvSpPr>
         <p:spPr>
           <a:xfrm flipV="1">
-            <a:off x="-12358" y="-3"/>
-            <a:ext cx="9156357" cy="4572002"/>
-          </a:xfrm>
-          <a:prstGeom prst="rect">
-            <a:avLst/>
-          </a:prstGeom>
-          <a:solidFill>
-            <a:schemeClr val="bg1"/>
-          </a:solidFill>
-          <a:ln>
-            <a:noFill/>
-          </a:ln>
-        </p:spPr>
-        <p:style>
-          <a:lnRef idx="2">
-            <a:schemeClr val="accent1">
-              <a:shade val="50000"/>
-            </a:schemeClr>
-          </a:lnRef>
-          <a:fillRef idx="1">
-            <a:schemeClr val="accent1"/>
-          </a:fillRef>
-          <a:effectRef idx="0">
-            <a:schemeClr val="accent1"/>
-          </a:effectRef>
-          <a:fontRef idx="minor">
-            <a:schemeClr val="lt1"/>
-          </a:fontRef>
-        </p:style>
-        <p:txBody>
-          <a:bodyPr rtlCol="0" anchor="ctr"/>
-          <a:lstStyle/>
-          <a:p>
-            <a:pPr algn="ctr"/>
-            <a:endParaRPr lang="en-US">
-              <a:solidFill>
-                <a:prstClr val="white"/>
-              </a:solidFill>
-            </a:endParaRPr>
-          </a:p>
-        </p:txBody>
-      </p:sp>
-      <p:sp>
-        <p:nvSpPr>
-          <p:cNvPr id="5" name="TextBox 4"/>
-          <p:cNvSpPr txBox="1"/>
-          <p:nvPr/>
-        </p:nvSpPr>
-        <p:spPr>
-          <a:xfrm>
-            <a:off x="228600" y="6248400"/>
-            <a:ext cx="8686800" cy="461665"/>
-          </a:xfrm>
-          <a:prstGeom prst="rect">
-            <a:avLst/>
-          </a:prstGeom>
-          <a:noFill/>
-        </p:spPr>
-        <p:txBody>
-          <a:bodyPr wrap="square" rtlCol="0">
-            <a:spAutoFit/>
-          </a:bodyPr>
-          <a:lstStyle/>
-          <a:p>
-            <a:r>
-              <a:rPr lang="en-US" sz="2400" dirty="0" smtClean="0">
-                <a:solidFill>
-                  <a:prstClr val="white">
-                    <a:lumMod val="65000"/>
-                  </a:prstClr>
-                </a:solidFill>
-              </a:rPr>
-              <a:t>How -&gt; Two day intense hands-on training</a:t>
-            </a:r>
-            <a:endParaRPr lang="en-US" sz="2400" dirty="0">
-              <a:solidFill>
-                <a:prstClr val="white">
-                  <a:lumMod val="65000"/>
-                </a:prstClr>
-              </a:solidFill>
-            </a:endParaRPr>
-          </a:p>
-        </p:txBody>
-      </p:sp>
-      <p:sp>
-        <p:nvSpPr>
-          <p:cNvPr id="3" name="TextBox 2"/>
-          <p:cNvSpPr txBox="1"/>
-          <p:nvPr/>
-        </p:nvSpPr>
-        <p:spPr>
-          <a:xfrm>
-            <a:off x="609600" y="4953000"/>
-            <a:ext cx="8001000" cy="923330"/>
-          </a:xfrm>
-          <a:prstGeom prst="rect">
-            <a:avLst/>
-          </a:prstGeom>
-          <a:noFill/>
-        </p:spPr>
-        <p:txBody>
-          <a:bodyPr wrap="square" rtlCol="0">
-            <a:spAutoFit/>
-          </a:bodyPr>
-          <a:lstStyle/>
-          <a:p>
-            <a:pPr algn="ctr"/>
-            <a:r>
-              <a:rPr lang="en-US" sz="5400" b="1" dirty="0" smtClean="0">
-                <a:solidFill>
-                  <a:prstClr val="white"/>
-                </a:solidFill>
-              </a:rPr>
-              <a:t>http://erlangcamp.com</a:t>
-            </a:r>
-            <a:endParaRPr lang="en-US" sz="5400" b="1" dirty="0">
-              <a:solidFill>
-                <a:prstClr val="white"/>
-              </a:solidFill>
-            </a:endParaRPr>
-          </a:p>
-        </p:txBody>
-      </p:sp>
-      <p:pic>
-        <p:nvPicPr>
-          <p:cNvPr id="2" name="Picture 1"/>
-          <p:cNvPicPr>
-            <a:picLocks noChangeAspect="1"/>
-          </p:cNvPicPr>
-          <p:nvPr/>
-        </p:nvPicPr>
-        <p:blipFill>
-          <a:blip r:embed="rId2"/>
-          <a:stretch>
-            <a:fillRect/>
-          </a:stretch>
-        </p:blipFill>
-        <p:spPr>
-          <a:xfrm>
-            <a:off x="609600" y="228600"/>
-            <a:ext cx="7796563" cy="4241777"/>
-          </a:xfrm>
-          <a:prstGeom prst="rect">
-            <a:avLst/>
-          </a:prstGeom>
-        </p:spPr>
-      </p:pic>
-    </p:spTree>
-    <p:extLst>
-      <p:ext uri="{BB962C8B-B14F-4D97-AF65-F5344CB8AC3E}">
-        <p14:creationId xmlns:p14="http://schemas.microsoft.com/office/powerpoint/2010/main" val="3699117522"/>
-      </p:ext>
-    </p:extLst>
-  </p:cSld>
-  <p:clrMapOvr>
-    <a:masterClrMapping/>
-  </p:clrMapOvr>
-  <mc:AlternateContent xmlns:mc="http://schemas.openxmlformats.org/markup-compatibility/2006" xmlns:p14="http://schemas.microsoft.com/office/powerpoint/2010/main">
-    <mc:Choice Requires="p14">
-      <p:transition spd="slow" p14:dur="2000" advTm="52418"/>
-    </mc:Choice>
-    <mc:Fallback xmlns="">
-      <p:transition spd="slow" advTm="52418"/>
-    </mc:Fallback>
-  </mc:AlternateContent>
-  <p:timing>
-    <p:tnLst>
-      <p:par>
-        <p:cTn id="1" dur="indefinite" restart="never" nodeType="tmRoot"/>
-      </p:par>
-    </p:tnLst>
-  </p:timing>
-</p:sld>
-</file>
-
-<file path=ppt/slides/slide2.xml><?xml version="1.0" encoding="utf-8"?>
-<p:sld xmlns:a="http://schemas.openxmlformats.org/drawingml/2006/main" xmlns:r="http://schemas.openxmlformats.org/officeDocument/2006/relationships" xmlns:p="http://schemas.openxmlformats.org/presentationml/2006/main">
-  <p:cSld>
-    <p:spTree>
-      <p:nvGrpSpPr>
-        <p:cNvPr id="1" name=""/>
-        <p:cNvGrpSpPr/>
-        <p:nvPr/>
-      </p:nvGrpSpPr>
-      <p:grpSpPr>
-        <a:xfrm>
-          <a:off x="0" y="0"/>
-          <a:ext cx="0" cy="0"/>
-          <a:chOff x="0" y="0"/>
-          <a:chExt cx="0" cy="0"/>
-        </a:xfrm>
-      </p:grpSpPr>
-      <p:sp>
-        <p:nvSpPr>
-          <p:cNvPr id="5" name="TextBox 4"/>
-          <p:cNvSpPr txBox="1"/>
-          <p:nvPr/>
-        </p:nvSpPr>
-        <p:spPr>
-          <a:xfrm>
-            <a:off x="3588398" y="1143000"/>
-            <a:ext cx="1967205" cy="4708981"/>
-          </a:xfrm>
-          <a:prstGeom prst="rect">
-            <a:avLst/>
-          </a:prstGeom>
-          <a:noFill/>
-        </p:spPr>
-        <p:txBody>
-          <a:bodyPr wrap="none" rtlCol="0">
-            <a:spAutoFit/>
-          </a:bodyPr>
-          <a:lstStyle/>
-          <a:p>
-            <a:r>
-              <a:rPr lang="en-US" sz="30000" b="1" dirty="0" smtClean="0"/>
-              <a:t>?</a:t>
-            </a:r>
-            <a:endParaRPr lang="en-US" sz="30000" b="1" dirty="0"/>
-          </a:p>
-        </p:txBody>
-      </p:sp>
-    </p:spTree>
-    <p:extLst>
-      <p:ext uri="{BB962C8B-B14F-4D97-AF65-F5344CB8AC3E}">
-        <p14:creationId xmlns:p14="http://schemas.microsoft.com/office/powerpoint/2010/main" val="2969805772"/>
-      </p:ext>
-    </p:extLst>
-  </p:cSld>
-  <p:clrMapOvr>
-    <a:masterClrMapping/>
-  </p:clrMapOvr>
-  <p:timing>
-    <p:tnLst>
-      <p:par>
-        <p:cTn id="1" dur="indefinite" restart="never" nodeType="tmRoot"/>
-      </p:par>
-    </p:tnLst>
-  </p:timing>
-</p:sld>
-</file>
-
-<file path=ppt/slides/slide20.xml><?xml version="1.0" encoding="utf-8"?>
-<p:sld xmlns:a="http://schemas.openxmlformats.org/drawingml/2006/main" xmlns:r="http://schemas.openxmlformats.org/officeDocument/2006/relationships" xmlns:p="http://schemas.openxmlformats.org/presentationml/2006/main">
-  <p:cSld>
-    <p:bg>
-      <p:bgPr>
-        <a:solidFill>
-          <a:schemeClr val="tx1"/>
-        </a:solidFill>
-        <a:effectLst/>
-      </p:bgPr>
-    </p:bg>
-    <p:spTree>
-      <p:nvGrpSpPr>
-        <p:cNvPr id="1" name=""/>
-        <p:cNvGrpSpPr/>
-        <p:nvPr/>
-      </p:nvGrpSpPr>
-      <p:grpSpPr>
-        <a:xfrm>
-          <a:off x="0" y="0"/>
-          <a:ext cx="0" cy="0"/>
-          <a:chOff x="0" y="0"/>
-          <a:chExt cx="0" cy="0"/>
-        </a:xfrm>
-      </p:grpSpPr>
-      <p:sp>
-        <p:nvSpPr>
-          <p:cNvPr id="7" name="Rectangle 6"/>
-          <p:cNvSpPr/>
-          <p:nvPr/>
-        </p:nvSpPr>
-        <p:spPr>
-          <a:xfrm flipV="1">
             <a:off x="-12358" y="0"/>
             <a:ext cx="9156357" cy="4572002"/>
           </a:xfrm>
@@ -18949,14 +18768,81 @@
   <p:timing>
     <p:tnLst>
       <p:par>
-        <p:cTn id="1" dur="indefinite" restart="never" nodeType="tmRoot"/>
+        <p:cTn xmlns:p14="http://schemas.microsoft.com/office/powerpoint/2010/main" id="1" dur="indefinite" restart="never" nodeType="tmRoot"/>
       </p:par>
     </p:tnLst>
   </p:timing>
 </p:sld>
 </file>
 
-<file path=ppt/slides/slide21.xml><?xml version="1.0" encoding="utf-8"?>
+<file path=ppt/slides/slide2.xml><?xml version="1.0" encoding="utf-8"?>
+<p:sld xmlns:a="http://schemas.openxmlformats.org/drawingml/2006/main" xmlns:r="http://schemas.openxmlformats.org/officeDocument/2006/relationships" xmlns:p="http://schemas.openxmlformats.org/presentationml/2006/main">
+  <p:cSld>
+    <p:spTree>
+      <p:nvGrpSpPr>
+        <p:cNvPr id="1" name=""/>
+        <p:cNvGrpSpPr/>
+        <p:nvPr/>
+      </p:nvGrpSpPr>
+      <p:grpSpPr>
+        <a:xfrm>
+          <a:off x="0" y="0"/>
+          <a:ext cx="0" cy="0"/>
+          <a:chOff x="0" y="0"/>
+          <a:chExt cx="0" cy="0"/>
+        </a:xfrm>
+      </p:grpSpPr>
+      <p:sp>
+        <p:nvSpPr>
+          <p:cNvPr id="5" name="TextBox 4"/>
+          <p:cNvSpPr txBox="1"/>
+          <p:nvPr/>
+        </p:nvSpPr>
+        <p:spPr>
+          <a:xfrm>
+            <a:off x="3588398" y="1143000"/>
+            <a:ext cx="1967205" cy="4708981"/>
+          </a:xfrm>
+          <a:prstGeom prst="rect">
+            <a:avLst/>
+          </a:prstGeom>
+          <a:noFill/>
+        </p:spPr>
+        <p:txBody>
+          <a:bodyPr wrap="none" rtlCol="0">
+            <a:spAutoFit/>
+          </a:bodyPr>
+          <a:lstStyle/>
+          <a:p>
+            <a:r>
+              <a:rPr lang="en-US" sz="30000" b="1" dirty="0" smtClean="0"/>
+              <a:t>?</a:t>
+            </a:r>
+            <a:endParaRPr lang="en-US" sz="30000" b="1" dirty="0"/>
+          </a:p>
+        </p:txBody>
+      </p:sp>
+    </p:spTree>
+    <p:extLst>
+      <p:ext uri="{BB962C8B-B14F-4D97-AF65-F5344CB8AC3E}">
+        <p14:creationId xmlns:p14="http://schemas.microsoft.com/office/powerpoint/2010/main" val="2969805772"/>
+      </p:ext>
+    </p:extLst>
+  </p:cSld>
+  <p:clrMapOvr>
+    <a:masterClrMapping/>
+  </p:clrMapOvr>
+  <p:timing>
+    <p:tnLst>
+      <p:par>
+        <p:cTn xmlns:p14="http://schemas.microsoft.com/office/powerpoint/2010/main" id="1" dur="indefinite" restart="never" nodeType="tmRoot"/>
+      </p:par>
+    </p:tnLst>
+  </p:timing>
+</p:sld>
+</file>
+
+<file path=ppt/slides/slide20.xml><?xml version="1.0" encoding="utf-8"?>
 <p:sld xmlns:a="http://schemas.openxmlformats.org/drawingml/2006/main" xmlns:r="http://schemas.openxmlformats.org/officeDocument/2006/relationships" xmlns:p="http://schemas.openxmlformats.org/presentationml/2006/main">
   <p:cSld>
     <p:bg>
@@ -19171,14 +19057,14 @@
           </a:ln>
           <a:effectLst/>
           <a:extLst>
-            <a:ext uri="{909E8E84-426E-40DD-AFC4-6F175D3DCCD1}">
+            <a:ext uri="{909E8E84-426E-40dd-AFC4-6F175D3DCCD1}">
               <a14:hiddenFill xmlns:a14="http://schemas.microsoft.com/office/drawing/2010/main">
                 <a:solidFill>
                   <a:schemeClr val="accent1"/>
                 </a:solidFill>
               </a14:hiddenFill>
             </a:ext>
-            <a:ext uri="{91240B29-F687-4F45-9708-019B960494DF}">
+            <a:ext uri="{91240B29-F687-4f45-9708-019B960494DF}">
               <a14:hiddenLine xmlns:a14="http://schemas.microsoft.com/office/drawing/2010/main" w="9525">
                 <a:solidFill>
                   <a:schemeClr val="tx1"/>
@@ -19188,7 +19074,7 @@
                 <a:tailEnd/>
               </a14:hiddenLine>
             </a:ext>
-            <a:ext uri="{AF507438-7753-43E0-B8FC-AC1667EBCBE1}">
+            <a:ext uri="{AF507438-7753-43e0-B8FC-AC1667EBCBE1}">
               <a14:hiddenEffects xmlns:a14="http://schemas.microsoft.com/office/drawing/2010/main">
                 <a:effectLst>
                   <a:outerShdw dist="35921" dir="2700000" algn="ctr" rotWithShape="0">
@@ -19342,7 +19228,7 @@
   <p:timing>
     <p:tnLst>
       <p:par>
-        <p:cTn id="1" dur="indefinite" restart="never" nodeType="tmRoot"/>
+        <p:cTn xmlns:p14="http://schemas.microsoft.com/office/powerpoint/2010/main" id="1" dur="indefinite" restart="never" nodeType="tmRoot"/>
       </p:par>
     </p:tnLst>
   </p:timing>
@@ -19397,7 +19283,7 @@
           </a:prstGeom>
           <a:noFill/>
           <a:extLst>
-            <a:ext uri="{909E8E84-426E-40DD-AFC4-6F175D3DCCD1}">
+            <a:ext uri="{909E8E84-426E-40dd-AFC4-6F175D3DCCD1}">
               <a14:hiddenFill xmlns:a14="http://schemas.microsoft.com/office/drawing/2010/main">
                 <a:solidFill>
                   <a:srgbClr val="FFFFFF"/>
@@ -19457,7 +19343,7 @@
   <p:timing>
     <p:tnLst>
       <p:par>
-        <p:cTn id="1" dur="indefinite" restart="never" nodeType="tmRoot">
+        <p:cTn xmlns:p14="http://schemas.microsoft.com/office/powerpoint/2010/main" id="1" dur="indefinite" restart="never" nodeType="tmRoot">
           <p:childTnLst>
             <p:seq concurrent="1" nextAc="seek">
               <p:cTn id="2" dur="indefinite" nodeType="mainSeq">
@@ -19759,7 +19645,7 @@
   <p:timing>
     <p:tnLst>
       <p:par>
-        <p:cTn id="1" dur="indefinite" restart="never" nodeType="tmRoot">
+        <p:cTn xmlns:p14="http://schemas.microsoft.com/office/powerpoint/2010/main" id="1" dur="indefinite" restart="never" nodeType="tmRoot">
           <p:childTnLst>
             <p:seq concurrent="1" nextAc="seek">
               <p:cTn id="2" dur="indefinite" nodeType="mainSeq">
@@ -20060,7 +19946,7 @@
   <p:timing>
     <p:tnLst>
       <p:par>
-        <p:cTn id="1" dur="indefinite" restart="never" nodeType="tmRoot"/>
+        <p:cTn xmlns:p14="http://schemas.microsoft.com/office/powerpoint/2010/main" id="1" dur="indefinite" restart="never" nodeType="tmRoot"/>
       </p:par>
     </p:tnLst>
   </p:timing>
@@ -20207,7 +20093,7 @@
   <p:timing>
     <p:tnLst>
       <p:par>
-        <p:cTn id="1" dur="indefinite" restart="never" nodeType="tmRoot"/>
+        <p:cTn xmlns:p14="http://schemas.microsoft.com/office/powerpoint/2010/main" id="1" dur="indefinite" restart="never" nodeType="tmRoot"/>
       </p:par>
     </p:tnLst>
   </p:timing>
@@ -20262,7 +20148,7 @@
           </a:prstGeom>
           <a:noFill/>
           <a:extLst>
-            <a:ext uri="{909E8E84-426E-40DD-AFC4-6F175D3DCCD1}">
+            <a:ext uri="{909E8E84-426E-40dd-AFC4-6F175D3DCCD1}">
               <a14:hiddenFill xmlns:a14="http://schemas.microsoft.com/office/drawing/2010/main">
                 <a:solidFill>
                   <a:srgbClr val="FFFFFF"/>
@@ -20323,7 +20209,7 @@
   <p:timing>
     <p:tnLst>
       <p:par>
-        <p:cTn id="1" dur="indefinite" restart="never" nodeType="tmRoot"/>
+        <p:cTn xmlns:p14="http://schemas.microsoft.com/office/powerpoint/2010/main" id="1" dur="indefinite" restart="never" nodeType="tmRoot"/>
       </p:par>
     </p:tnLst>
   </p:timing>
@@ -21007,7 +20893,7 @@
   <p:timing>
     <p:tnLst>
       <p:par>
-        <p:cTn id="1" dur="indefinite" restart="never" nodeType="tmRoot">
+        <p:cTn xmlns:p14="http://schemas.microsoft.com/office/powerpoint/2010/main" id="1" dur="indefinite" restart="never" nodeType="tmRoot">
           <p:childTnLst>
             <p:seq concurrent="1" nextAc="seek">
               <p:cTn id="2" dur="indefinite" nodeType="mainSeq">
@@ -21565,7 +21451,7 @@
   <p:timing>
     <p:tnLst>
       <p:par>
-        <p:cTn id="1" dur="indefinite" restart="never" nodeType="tmRoot">
+        <p:cTn xmlns:p14="http://schemas.microsoft.com/office/powerpoint/2010/main" id="1" dur="indefinite" restart="never" nodeType="tmRoot">
           <p:childTnLst>
             <p:seq concurrent="1" nextAc="seek">
               <p:cTn id="2" dur="indefinite" nodeType="mainSeq">

</xml_diff>